<commit_message>
Upgraded NServiceBus 2.1 to 2.0, I can't be bothered changing the name of the folder.
</commit_message>
<xml_diff>
--- a/lib/NServiceBus.2.1.0.1305/docs/DistributedPubSub.pptx
+++ b/lib/NServiceBus.2.1.0.1305/docs/DistributedPubSub.pptx
@@ -295,7 +295,7 @@
                 </a:solidFill>
               </a:rPr>
               <a:pPr/>
-              <a:t>11/3/2009</a:t>
+              <a:t>10/28/2009</a:t>
             </a:fld>
             <a:endParaRPr lang="en-US">
               <a:solidFill>
@@ -492,7 +492,7 @@
                 </a:solidFill>
               </a:rPr>
               <a:pPr/>
-              <a:t>11/3/2009</a:t>
+              <a:t>10/28/2009</a:t>
             </a:fld>
             <a:endParaRPr lang="en-US">
               <a:solidFill>
@@ -699,7 +699,7 @@
                 </a:solidFill>
               </a:rPr>
               <a:pPr/>
-              <a:t>11/3/2009</a:t>
+              <a:t>10/28/2009</a:t>
             </a:fld>
             <a:endParaRPr lang="en-US">
               <a:solidFill>
@@ -896,7 +896,7 @@
                 </a:solidFill>
               </a:rPr>
               <a:pPr/>
-              <a:t>11/3/2009</a:t>
+              <a:t>10/28/2009</a:t>
             </a:fld>
             <a:endParaRPr lang="en-US">
               <a:solidFill>
@@ -1169,7 +1169,7 @@
                 </a:solidFill>
               </a:rPr>
               <a:pPr/>
-              <a:t>11/3/2009</a:t>
+              <a:t>10/28/2009</a:t>
             </a:fld>
             <a:endParaRPr lang="en-US">
               <a:solidFill>
@@ -1484,7 +1484,7 @@
                 </a:solidFill>
               </a:rPr>
               <a:pPr/>
-              <a:t>11/3/2009</a:t>
+              <a:t>10/28/2009</a:t>
             </a:fld>
             <a:endParaRPr lang="en-US">
               <a:solidFill>
@@ -1933,7 +1933,7 @@
                 </a:solidFill>
               </a:rPr>
               <a:pPr/>
-              <a:t>11/3/2009</a:t>
+              <a:t>10/28/2009</a:t>
             </a:fld>
             <a:endParaRPr lang="en-US">
               <a:solidFill>
@@ -2078,7 +2078,7 @@
                 </a:solidFill>
               </a:rPr>
               <a:pPr/>
-              <a:t>11/3/2009</a:t>
+              <a:t>10/28/2009</a:t>
             </a:fld>
             <a:endParaRPr lang="en-US">
               <a:solidFill>
@@ -2200,7 +2200,7 @@
                 </a:solidFill>
               </a:rPr>
               <a:pPr/>
-              <a:t>11/3/2009</a:t>
+              <a:t>10/28/2009</a:t>
             </a:fld>
             <a:endParaRPr lang="en-US">
               <a:solidFill>
@@ -2504,7 +2504,7 @@
                 </a:solidFill>
               </a:rPr>
               <a:pPr/>
-              <a:t>11/3/2009</a:t>
+              <a:t>10/28/2009</a:t>
             </a:fld>
             <a:endParaRPr lang="en-US">
               <a:solidFill>
@@ -2784,7 +2784,7 @@
                 </a:solidFill>
               </a:rPr>
               <a:pPr/>
-              <a:t>11/3/2009</a:t>
+              <a:t>10/28/2009</a:t>
             </a:fld>
             <a:endParaRPr lang="en-US">
               <a:solidFill>
@@ -3024,7 +3024,7 @@
                 </a:solidFill>
               </a:rPr>
               <a:pPr/>
-              <a:t>11/3/2009</a:t>
+              <a:t>10/28/2009</a:t>
             </a:fld>
             <a:endParaRPr lang="en-US">
               <a:solidFill>
@@ -4653,15 +4653,13 @@
       <p:cxnSp>
         <p:nvCxnSpPr>
           <p:cNvPr id="136" name="Straight Arrow Connector 135"/>
-          <p:cNvCxnSpPr>
-            <a:endCxn id="128" idx="1"/>
-          </p:cNvCxnSpPr>
+          <p:cNvCxnSpPr/>
           <p:nvPr/>
         </p:nvCxnSpPr>
         <p:spPr>
-          <a:xfrm flipV="1">
-            <a:off x="6553200" y="4800600"/>
-            <a:ext cx="838200" cy="304800"/>
+          <a:xfrm rot="5400000">
+            <a:off x="5295900" y="5372100"/>
+            <a:ext cx="685800" cy="304800"/>
           </a:xfrm>
           <a:prstGeom prst="straightConnector1">
             <a:avLst/>
@@ -4696,7 +4694,7 @@
         </p:nvSpPr>
         <p:spPr>
           <a:xfrm>
-            <a:off x="6858000" y="4343400"/>
+            <a:off x="5105400" y="5300246"/>
             <a:ext cx="625492" cy="307777"/>
           </a:xfrm>
           <a:prstGeom prst="rect">
@@ -4741,9 +4739,9 @@
           <p:nvPr/>
         </p:nvCxnSpPr>
         <p:spPr>
-          <a:xfrm rot="5400000">
-            <a:off x="5181600" y="5410200"/>
-            <a:ext cx="685800" cy="228600"/>
+          <a:xfrm rot="16200000" flipH="1">
+            <a:off x="6553200" y="5181600"/>
+            <a:ext cx="762000" cy="762000"/>
           </a:xfrm>
           <a:prstGeom prst="straightConnector1">
             <a:avLst/>
@@ -4780,7 +4778,7 @@
         </p:nvSpPr>
         <p:spPr>
           <a:xfrm>
-            <a:off x="4800600" y="5410200"/>
+            <a:off x="6934200" y="5334000"/>
             <a:ext cx="625492" cy="307777"/>
           </a:xfrm>
           <a:prstGeom prst="rect">
@@ -6214,7 +6212,7 @@
                             </p:stCondLst>
                             <p:childTnLst>
                               <p:par>
-                                <p:cTn id="45" presetID="22" presetClass="entr" presetSubtype="8" fill="hold" nodeType="afterEffect">
+                                <p:cTn id="45" presetID="22" presetClass="entr" presetSubtype="1" fill="hold" nodeType="afterEffect">
                                   <p:stCondLst>
                                     <p:cond delay="0"/>
                                   </p:stCondLst>
@@ -6237,7 +6235,7 @@
                                         <p:strVal val="visible"/>
                                       </p:to>
                                     </p:set>
-                                    <p:animEffect transition="in" filter="wipe(left)">
+                                    <p:animEffect transition="in" filter="wipe(up)">
                                       <p:cBhvr>
                                         <p:cTn id="47" dur="500"/>
                                         <p:tgtEl>
@@ -6721,7 +6719,7 @@
                             </p:stCondLst>
                             <p:childTnLst>
                               <p:par>
-                                <p:cTn id="90" presetID="22" presetClass="entr" presetSubtype="1" fill="hold" nodeType="afterEffect">
+                                <p:cTn id="90" presetID="22" presetClass="entr" presetSubtype="8" fill="hold" nodeType="afterEffect">
                                   <p:stCondLst>
                                     <p:cond delay="0"/>
                                   </p:stCondLst>
@@ -6744,7 +6742,7 @@
                                         <p:strVal val="visible"/>
                                       </p:to>
                                     </p:set>
-                                    <p:animEffect transition="in" filter="wipe(up)">
+                                    <p:animEffect transition="in" filter="wipe(left)">
                                       <p:cBhvr>
                                         <p:cTn id="92" dur="500"/>
                                         <p:tgtEl>

</xml_diff>